<commit_message>
Edit Intro to Git
</commit_message>
<xml_diff>
--- a/Intro to Git.pptx
+++ b/Intro to Git.pptx
@@ -107,6 +107,11 @@
       </a:defRPr>
     </a:lvl9pPr>
   </p:defaultTextStyle>
+  <p:extLst>
+    <p:ext uri="{EFAFB233-063F-42B5-8137-9DF3F51BA10A}">
+      <p15:sldGuideLst xmlns:p15="http://schemas.microsoft.com/office/powerpoint/2012/main"/>
+    </p:ext>
+  </p:extLst>
 </p:presentation>
 </file>
 
@@ -3914,6 +3919,21 @@
           <a:p>
             <a:r>
               <a:rPr lang="en-ID" dirty="0"/>
+              <a:t>git branch -M &lt;</a:t>
+            </a:r>
+            <a:r>
+              <a:rPr lang="en-ID" dirty="0" err="1"/>
+              <a:t>branch_name</a:t>
+            </a:r>
+            <a:r>
+              <a:rPr lang="en-ID"/>
+              <a:t>&gt;</a:t>
+            </a:r>
+            <a:endParaRPr lang="en-ID" dirty="0"/>
+          </a:p>
+          <a:p>
+            <a:r>
+              <a:rPr lang="en-ID" dirty="0"/>
               <a:t>git remote add origin &lt;server&gt;  </a:t>
             </a:r>
           </a:p>
@@ -4004,7 +4024,9 @@
         </p:nvSpPr>
         <p:spPr/>
         <p:txBody>
-          <a:bodyPr/>
+          <a:bodyPr>
+            <a:normAutofit lnSpcReduction="10000"/>
+          </a:bodyPr>
           <a:lstStyle/>
           <a:p>
             <a:r>
@@ -4044,6 +4066,12 @@
           </a:p>
           <a:p>
             <a:endParaRPr lang="en-ID" dirty="0"/>
+          </a:p>
+          <a:p>
+            <a:r>
+              <a:rPr lang="en-ID" dirty="0"/>
+              <a:t>git status</a:t>
+            </a:r>
           </a:p>
           <a:p>
             <a:r>

</xml_diff>